<commit_message>
Added a winner xml and controller page(not implemented). Got the turns working correctly. When someone loses they get sent to the main menu.
</commit_message>
<xml_diff>
--- a/Cards War of the Gods.pptx
+++ b/Cards War of the Gods.pptx
@@ -3417,7 +3417,7 @@
         <p:spPr>
           <a:xfrm>
             <a:off x="1714558" y="2064471"/>
-            <a:ext cx="9797503" cy="4185761"/>
+            <a:ext cx="9797503" cy="2492990"/>
           </a:xfrm>
           <a:prstGeom prst="rect">
             <a:avLst/>
@@ -3482,7 +3482,7 @@
             </a:pPr>
             <a:r>
               <a:rPr lang="en-US" sz="2200" dirty="0"/>
-              <a:t>Creature Card from Opponent’s Battlefield</a:t>
+              <a:t>Opponent</a:t>
             </a:r>
           </a:p>
           <a:p>
@@ -3492,59 +3492,13 @@
             </a:pPr>
             <a:r>
               <a:rPr lang="en-US" sz="2200" dirty="0"/>
-              <a:t>Opponent</a:t>
-            </a:r>
-          </a:p>
-          <a:p>
-            <a:pPr marL="1371600" lvl="2" indent="-457200">
-              <a:buFont typeface="+mj-lt"/>
-              <a:buAutoNum type="alphaLcPeriod"/>
-            </a:pPr>
-            <a:r>
-              <a:rPr lang="en-US" sz="2200" dirty="0"/>
-              <a:t>Creature Card from Your Battlefield</a:t>
-            </a:r>
-          </a:p>
-          <a:p>
-            <a:pPr marL="1371600" lvl="2" indent="-457200">
-              <a:buFont typeface="+mj-lt"/>
-              <a:buAutoNum type="alphaLcPeriod"/>
-            </a:pPr>
-            <a:r>
-              <a:rPr lang="en-US" sz="2200" dirty="0"/>
-              <a:t>Yourself</a:t>
-            </a:r>
-          </a:p>
-          <a:p>
-            <a:pPr marL="914400" lvl="1" indent="-457200">
-              <a:buFont typeface="+mj-lt"/>
-              <a:buAutoNum type="arabicPeriod"/>
-            </a:pPr>
-            <a:r>
-              <a:rPr lang="en-US" sz="2200" dirty="0"/>
-              <a:t>Choose an Action</a:t>
-            </a:r>
-          </a:p>
-          <a:p>
-            <a:pPr marL="1371600" lvl="2" indent="-457200">
-              <a:buFont typeface="+mj-lt"/>
-              <a:buAutoNum type="alphaLcPeriod"/>
-            </a:pPr>
-            <a:r>
-              <a:rPr lang="en-US" sz="2200" dirty="0"/>
-              <a:t>Spell Card from your hand</a:t>
-            </a:r>
-          </a:p>
-          <a:p>
-            <a:pPr marL="1371600" lvl="2" indent="-457200">
-              <a:buFont typeface="+mj-lt"/>
-              <a:buAutoNum type="alphaLcPeriod"/>
-            </a:pPr>
-            <a:r>
-              <a:rPr lang="en-US" sz="2200" dirty="0"/>
-              <a:t>Creature Card from your battlefield to attack the target</a:t>
-            </a:r>
-            <a:endParaRPr lang="en-US" sz="2400" dirty="0"/>
+              <a:t>Creature Card from </a:t>
+            </a:r>
+            <a:r>
+              <a:rPr lang="en-US" sz="2200"/>
+              <a:t>Your Battlefield</a:t>
+            </a:r>
+            <a:endParaRPr lang="en-US" sz="2200" dirty="0"/>
           </a:p>
         </p:txBody>
       </p:sp>
@@ -3684,7 +3638,7 @@
             </a:r>
             <a:r>
               <a:rPr lang="en-US" dirty="0"/>
-              <a:t>: This is a collectable card application, which has a player vs. player game .</a:t>
+              <a:t>: This is a digital collectable card application, which has a player vs. player game .</a:t>
             </a:r>
           </a:p>
         </p:txBody>
@@ -3704,7 +3658,7 @@
         <p:spPr>
           <a:xfrm>
             <a:off x="1714558" y="2064471"/>
-            <a:ext cx="9797503" cy="4185761"/>
+            <a:ext cx="9797503" cy="2492990"/>
           </a:xfrm>
           <a:prstGeom prst="rect">
             <a:avLst/>
@@ -3769,7 +3723,7 @@
             </a:pPr>
             <a:r>
               <a:rPr lang="en-US" sz="2200" dirty="0"/>
-              <a:t>Creature Card from Opponent’s Battlefield</a:t>
+              <a:t>Opponent</a:t>
             </a:r>
           </a:p>
           <a:p>
@@ -3779,59 +3733,8 @@
             </a:pPr>
             <a:r>
               <a:rPr lang="en-US" sz="2200" dirty="0"/>
-              <a:t>Opponent</a:t>
-            </a:r>
-          </a:p>
-          <a:p>
-            <a:pPr marL="1371600" lvl="2" indent="-457200">
-              <a:buFont typeface="+mj-lt"/>
-              <a:buAutoNum type="alphaLcPeriod"/>
-            </a:pPr>
-            <a:r>
-              <a:rPr lang="en-US" sz="2200" dirty="0"/>
               <a:t>Creature Card from Your Battlefield</a:t>
             </a:r>
-          </a:p>
-          <a:p>
-            <a:pPr marL="1371600" lvl="2" indent="-457200">
-              <a:buFont typeface="+mj-lt"/>
-              <a:buAutoNum type="alphaLcPeriod"/>
-            </a:pPr>
-            <a:r>
-              <a:rPr lang="en-US" sz="2200" dirty="0"/>
-              <a:t>Yourself</a:t>
-            </a:r>
-          </a:p>
-          <a:p>
-            <a:pPr marL="914400" lvl="1" indent="-457200">
-              <a:buFont typeface="+mj-lt"/>
-              <a:buAutoNum type="arabicPeriod"/>
-            </a:pPr>
-            <a:r>
-              <a:rPr lang="en-US" sz="2200" dirty="0"/>
-              <a:t>Choose an Action</a:t>
-            </a:r>
-          </a:p>
-          <a:p>
-            <a:pPr marL="1371600" lvl="2" indent="-457200">
-              <a:buFont typeface="+mj-lt"/>
-              <a:buAutoNum type="alphaLcPeriod"/>
-            </a:pPr>
-            <a:r>
-              <a:rPr lang="en-US" sz="2200" dirty="0"/>
-              <a:t>Spell Card from your hand</a:t>
-            </a:r>
-          </a:p>
-          <a:p>
-            <a:pPr marL="1371600" lvl="2" indent="-457200">
-              <a:buFont typeface="+mj-lt"/>
-              <a:buAutoNum type="alphaLcPeriod"/>
-            </a:pPr>
-            <a:r>
-              <a:rPr lang="en-US" sz="2200" dirty="0"/>
-              <a:t>Creature Card from your battlefield to attack the target</a:t>
-            </a:r>
-            <a:endParaRPr lang="en-US" sz="2400" dirty="0"/>
           </a:p>
         </p:txBody>
       </p:sp>

</xml_diff>